<commit_message>
update slides for talk today
</commit_message>
<xml_diff>
--- a/ppt/Specifying-Compatible-Sharing-in-Data-Structures.pptx
+++ b/ppt/Specifying-Compatible-Sharing-in-Data-Structures.pptx
@@ -220,7 +220,7 @@
           <a:p>
             <a:fld id="{F398F11D-D64C-964B-9C28-EE167CC4714A}" type="datetimeFigureOut">
               <a:rPr lang="en-US" smtClean="0"/>
-              <a:t>10/10/15</a:t>
+              <a:t>4/11/15</a:t>
             </a:fld>
             <a:endParaRPr lang="en-US"/>
           </a:p>
@@ -386,7 +386,7 @@
           <a:p>
             <a:fld id="{C1E38573-D35D-5E43-9504-1003ECA82FB2}" type="datetimeFigureOut">
               <a:rPr lang="en-US" smtClean="0"/>
-              <a:t>10/10/15</a:t>
+              <a:t>4/11/15</a:t>
             </a:fld>
             <a:endParaRPr lang="en-US"/>
           </a:p>
@@ -783,6 +783,197 @@
           <a:bodyPr/>
           <a:lstStyle/>
           <a:p>
+            <a:r>
+              <a:rPr lang="en-US" dirty="0" smtClean="0"/>
+              <a:t>None of the free variables in R are modified in c</a:t>
+            </a:r>
+            <a:endParaRPr lang="en-US" dirty="0"/>
+          </a:p>
+        </p:txBody>
+      </p:sp>
+      <p:sp>
+        <p:nvSpPr>
+          <p:cNvPr id="4" name="Slide Number Placeholder 3"/>
+          <p:cNvSpPr>
+            <a:spLocks noGrp="1"/>
+          </p:cNvSpPr>
+          <p:nvPr>
+            <p:ph type="sldNum" sz="quarter" idx="10"/>
+          </p:nvPr>
+        </p:nvSpPr>
+        <p:spPr/>
+        <p:txBody>
+          <a:bodyPr/>
+          <a:lstStyle/>
+          <a:p>
+            <a:fld id="{B87C9B2C-FF25-5441-816B-883F904E73AD}" type="slidenum">
+              <a:rPr lang="en-US" smtClean="0"/>
+              <a:t>11</a:t>
+            </a:fld>
+            <a:endParaRPr lang="en-US"/>
+          </a:p>
+        </p:txBody>
+      </p:sp>
+    </p:spTree>
+    <p:extLst>
+      <p:ext uri="{BB962C8B-B14F-4D97-AF65-F5344CB8AC3E}">
+        <p14:creationId xmlns:p14="http://schemas.microsoft.com/office/powerpoint/2010/main" val="3155841662"/>
+      </p:ext>
+    </p:extLst>
+  </p:cSld>
+  <p:clrMapOvr>
+    <a:masterClrMapping/>
+  </p:clrMapOvr>
+</p:notes>
+</file>
+
+<file path=ppt/notesSlides/notesSlide3.xml><?xml version="1.0" encoding="utf-8"?>
+<p:notes xmlns:a="http://schemas.openxmlformats.org/drawingml/2006/main" xmlns:r="http://schemas.openxmlformats.org/officeDocument/2006/relationships" xmlns:p="http://schemas.openxmlformats.org/presentationml/2006/main">
+  <p:cSld>
+    <p:spTree>
+      <p:nvGrpSpPr>
+        <p:cNvPr id="1" name=""/>
+        <p:cNvGrpSpPr/>
+        <p:nvPr/>
+      </p:nvGrpSpPr>
+      <p:grpSpPr>
+        <a:xfrm>
+          <a:off x="0" y="0"/>
+          <a:ext cx="0" cy="0"/>
+          <a:chOff x="0" y="0"/>
+          <a:chExt cx="0" cy="0"/>
+        </a:xfrm>
+      </p:grpSpPr>
+      <p:sp>
+        <p:nvSpPr>
+          <p:cNvPr id="2" name="Slide Image Placeholder 1"/>
+          <p:cNvSpPr>
+            <a:spLocks noGrp="1" noRot="1" noChangeAspect="1"/>
+          </p:cNvSpPr>
+          <p:nvPr>
+            <p:ph type="sldImg"/>
+          </p:nvPr>
+        </p:nvSpPr>
+        <p:spPr/>
+      </p:sp>
+      <p:sp>
+        <p:nvSpPr>
+          <p:cNvPr id="3" name="Notes Placeholder 2"/>
+          <p:cNvSpPr>
+            <a:spLocks noGrp="1"/>
+          </p:cNvSpPr>
+          <p:nvPr>
+            <p:ph type="body" idx="1"/>
+          </p:nvPr>
+        </p:nvSpPr>
+        <p:spPr/>
+        <p:txBody>
+          <a:bodyPr/>
+          <a:lstStyle/>
+          <a:p>
+            <a:r>
+              <a:rPr lang="en-US" dirty="0" smtClean="0"/>
+              <a:t>Se-</a:t>
+            </a:r>
+            <a:r>
+              <a:rPr lang="en-US" dirty="0" err="1" smtClean="0"/>
+              <a:t>zera</a:t>
+            </a:r>
+            <a:r>
+              <a:rPr lang="en-US" dirty="0" smtClean="0"/>
+              <a:t/>
+            </a:r>
+            <a:br>
+              <a:rPr lang="en-US" dirty="0" smtClean="0"/>
+            </a:br>
+            <a:r>
+              <a:rPr lang="en-US" dirty="0" smtClean="0"/>
+              <a:t>Si-here-nu</a:t>
+            </a:r>
+            <a:endParaRPr lang="en-US" dirty="0"/>
+          </a:p>
+        </p:txBody>
+      </p:sp>
+      <p:sp>
+        <p:nvSpPr>
+          <p:cNvPr id="4" name="Slide Number Placeholder 3"/>
+          <p:cNvSpPr>
+            <a:spLocks noGrp="1"/>
+          </p:cNvSpPr>
+          <p:nvPr>
+            <p:ph type="sldNum" sz="quarter" idx="10"/>
+          </p:nvPr>
+        </p:nvSpPr>
+        <p:spPr/>
+        <p:txBody>
+          <a:bodyPr/>
+          <a:lstStyle/>
+          <a:p>
+            <a:fld id="{B87C9B2C-FF25-5441-816B-883F904E73AD}" type="slidenum">
+              <a:rPr lang="en-US" smtClean="0"/>
+              <a:t>15</a:t>
+            </a:fld>
+            <a:endParaRPr lang="en-US"/>
+          </a:p>
+        </p:txBody>
+      </p:sp>
+    </p:spTree>
+    <p:extLst>
+      <p:ext uri="{BB962C8B-B14F-4D97-AF65-F5344CB8AC3E}">
+        <p14:creationId xmlns:p14="http://schemas.microsoft.com/office/powerpoint/2010/main" val="3101557287"/>
+      </p:ext>
+    </p:extLst>
+  </p:cSld>
+  <p:clrMapOvr>
+    <a:masterClrMapping/>
+  </p:clrMapOvr>
+</p:notes>
+</file>
+
+<file path=ppt/notesSlides/notesSlide4.xml><?xml version="1.0" encoding="utf-8"?>
+<p:notes xmlns:a="http://schemas.openxmlformats.org/drawingml/2006/main" xmlns:r="http://schemas.openxmlformats.org/officeDocument/2006/relationships" xmlns:p="http://schemas.openxmlformats.org/presentationml/2006/main">
+  <p:cSld>
+    <p:spTree>
+      <p:nvGrpSpPr>
+        <p:cNvPr id="1" name=""/>
+        <p:cNvGrpSpPr/>
+        <p:nvPr/>
+      </p:nvGrpSpPr>
+      <p:grpSpPr>
+        <a:xfrm>
+          <a:off x="0" y="0"/>
+          <a:ext cx="0" cy="0"/>
+          <a:chOff x="0" y="0"/>
+          <a:chExt cx="0" cy="0"/>
+        </a:xfrm>
+      </p:grpSpPr>
+      <p:sp>
+        <p:nvSpPr>
+          <p:cNvPr id="2" name="Slide Image Placeholder 1"/>
+          <p:cNvSpPr>
+            <a:spLocks noGrp="1" noRot="1" noChangeAspect="1"/>
+          </p:cNvSpPr>
+          <p:nvPr>
+            <p:ph type="sldImg"/>
+          </p:nvPr>
+        </p:nvSpPr>
+        <p:spPr/>
+      </p:sp>
+      <p:sp>
+        <p:nvSpPr>
+          <p:cNvPr id="3" name="Notes Placeholder 2"/>
+          <p:cNvSpPr>
+            <a:spLocks noGrp="1"/>
+          </p:cNvSpPr>
+          <p:nvPr>
+            <p:ph type="body" idx="1"/>
+          </p:nvPr>
+        </p:nvSpPr>
+        <p:spPr/>
+        <p:txBody>
+          <a:bodyPr/>
+          <a:lstStyle/>
+          <a:p>
             <a:endParaRPr lang="en-US" dirty="0"/>
           </a:p>
         </p:txBody>
@@ -1004,7 +1195,7 @@
           <a:p>
             <a:fld id="{F6C06A12-AF4B-0A4B-BCC3-3D437478D93E}" type="datetime1">
               <a:rPr lang="en-SG" smtClean="0"/>
-              <a:t>10/10/15</a:t>
+              <a:t>4/11/15</a:t>
             </a:fld>
             <a:endParaRPr lang="en-US"/>
           </a:p>
@@ -1178,7 +1369,7 @@
           <a:p>
             <a:fld id="{1C37227D-13E1-C04E-8B65-4DFAF0556D76}" type="datetime1">
               <a:rPr lang="en-SG" smtClean="0"/>
-              <a:t>10/10/15</a:t>
+              <a:t>4/11/15</a:t>
             </a:fld>
             <a:endParaRPr lang="en-US"/>
           </a:p>
@@ -1362,7 +1553,7 @@
           <a:p>
             <a:fld id="{56491E7B-8A37-CC4A-B6B8-36529154873A}" type="datetime1">
               <a:rPr lang="en-SG" smtClean="0"/>
-              <a:t>10/10/15</a:t>
+              <a:t>4/11/15</a:t>
             </a:fld>
             <a:endParaRPr lang="en-US"/>
           </a:p>
@@ -1536,7 +1727,7 @@
           <a:p>
             <a:fld id="{1469CC5A-7EEF-5C47-A97F-1DBCC349BA49}" type="datetime1">
               <a:rPr lang="en-SG" smtClean="0"/>
-              <a:t>10/10/15</a:t>
+              <a:t>4/11/15</a:t>
             </a:fld>
             <a:endParaRPr lang="en-US"/>
           </a:p>
@@ -1786,7 +1977,7 @@
           <a:p>
             <a:fld id="{69EE7C4A-5F23-AA4A-8FC2-9005C956FC8C}" type="datetime1">
               <a:rPr lang="en-SG" smtClean="0"/>
-              <a:t>10/10/15</a:t>
+              <a:t>4/11/15</a:t>
             </a:fld>
             <a:endParaRPr lang="en-US"/>
           </a:p>
@@ -2078,7 +2269,7 @@
           <a:p>
             <a:fld id="{A59113FF-4167-8147-90FE-E46A8BC17EC7}" type="datetime1">
               <a:rPr lang="en-SG" smtClean="0"/>
-              <a:t>10/10/15</a:t>
+              <a:t>4/11/15</a:t>
             </a:fld>
             <a:endParaRPr lang="en-US"/>
           </a:p>
@@ -2504,7 +2695,7 @@
           <a:p>
             <a:fld id="{C0B7BC73-F81C-C448-AB68-DB74F3CF97F4}" type="datetime1">
               <a:rPr lang="en-SG" smtClean="0"/>
-              <a:t>10/10/15</a:t>
+              <a:t>4/11/15</a:t>
             </a:fld>
             <a:endParaRPr lang="en-US"/>
           </a:p>
@@ -2626,7 +2817,7 @@
           <a:p>
             <a:fld id="{3C449545-CF85-B042-9113-BD2EBFA692F1}" type="datetime1">
               <a:rPr lang="en-SG" smtClean="0"/>
-              <a:t>10/10/15</a:t>
+              <a:t>4/11/15</a:t>
             </a:fld>
             <a:endParaRPr lang="en-US"/>
           </a:p>
@@ -2725,7 +2916,7 @@
           <a:p>
             <a:fld id="{0E676A48-F04A-3B47-9A80-D956DAF55D2F}" type="datetime1">
               <a:rPr lang="en-SG" smtClean="0"/>
-              <a:t>10/10/15</a:t>
+              <a:t>4/11/15</a:t>
             </a:fld>
             <a:endParaRPr lang="en-US"/>
           </a:p>
@@ -3006,7 +3197,7 @@
           <a:p>
             <a:fld id="{90EE89E2-6073-6C44-B738-74E1C8FAD217}" type="datetime1">
               <a:rPr lang="en-SG" smtClean="0"/>
-              <a:t>10/10/15</a:t>
+              <a:t>4/11/15</a:t>
             </a:fld>
             <a:endParaRPr lang="en-US"/>
           </a:p>
@@ -3263,7 +3454,7 @@
           <a:p>
             <a:fld id="{A75F4F08-03EA-0541-AC5B-472575311224}" type="datetime1">
               <a:rPr lang="en-SG" smtClean="0"/>
-              <a:t>10/10/15</a:t>
+              <a:t>4/11/15</a:t>
             </a:fld>
             <a:endParaRPr lang="en-US"/>
           </a:p>
@@ -3480,7 +3671,7 @@
           <a:p>
             <a:fld id="{CC7A2F2B-736D-A54C-826A-F22E15BB5F2D}" type="datetime1">
               <a:rPr lang="en-SG" smtClean="0"/>
-              <a:t>10/10/15</a:t>
+              <a:t>4/11/15</a:t>
             </a:fld>
             <a:endParaRPr lang="en-US"/>
           </a:p>
@@ -3897,8 +4088,8 @@
         </p:nvSpPr>
         <p:spPr>
           <a:xfrm>
-            <a:off x="1371600" y="3886200"/>
-            <a:ext cx="6400800" cy="878490"/>
+            <a:off x="1371600" y="3886198"/>
+            <a:ext cx="6400800" cy="2602415"/>
           </a:xfrm>
         </p:spPr>
         <p:txBody>
@@ -3941,6 +4132,26 @@
             <a:r>
               <a:rPr lang="en-US" sz="2000" dirty="0" smtClean="0"/>
               <a:t>National University of Singapore</a:t>
+            </a:r>
+            <a:br>
+              <a:rPr lang="en-US" sz="2000" dirty="0" smtClean="0"/>
+            </a:br>
+            <a:endParaRPr lang="en-US" sz="2000" dirty="0" smtClean="0"/>
+          </a:p>
+          <a:p>
+            <a:endParaRPr lang="en-US" sz="2000" dirty="0"/>
+          </a:p>
+          <a:p>
+            <a:r>
+              <a:rPr lang="en-US" sz="2000" dirty="0" smtClean="0"/>
+              <a:t/>
+            </a:r>
+            <a:br>
+              <a:rPr lang="en-US" sz="2000" dirty="0" smtClean="0"/>
+            </a:br>
+            <a:r>
+              <a:rPr lang="en-US" sz="2000" dirty="0" smtClean="0"/>
+              <a:t>ICFEM 2015</a:t>
             </a:r>
             <a:endParaRPr lang="en-US" sz="2000" dirty="0"/>
           </a:p>
@@ -4212,7 +4423,7 @@
           <a:p>
             <a:fld id="{2B94DB4C-A62D-4644-AA0D-64F079736822}" type="datetime1">
               <a:rPr lang="en-SG" smtClean="0"/>
-              <a:t>10/10/15</a:t>
+              <a:t>4/11/15</a:t>
             </a:fld>
             <a:endParaRPr lang="en-US"/>
           </a:p>
@@ -4931,7 +5142,7 @@
           <a:p>
             <a:fld id="{E1EC81D5-2AB1-D847-A86D-86A503A9E9EA}" type="datetime1">
               <a:rPr lang="en-SG" smtClean="0"/>
-              <a:t>10/10/15</a:t>
+              <a:t>4/11/15</a:t>
             </a:fld>
             <a:endParaRPr lang="en-US"/>
           </a:p>
@@ -5074,8 +5285,13 @@
           <a:p>
             <a:r>
               <a:rPr lang="en-US" dirty="0" smtClean="0"/>
-              <a:t>Aliased Heaps (&amp;)</a:t>
-            </a:r>
+              <a:t>Aliased Heaps (</a:t>
+            </a:r>
+            <a:r>
+              <a:rPr lang="en-US" dirty="0" smtClean="0"/>
+              <a:t>&amp;)</a:t>
+            </a:r>
+            <a:endParaRPr lang="en-US" dirty="0" smtClean="0"/>
           </a:p>
           <a:p>
             <a:pPr lvl="1"/>
@@ -5144,7 +5360,7 @@
           <a:p>
             <a:fld id="{088FD039-C2F7-984A-80BC-74324AA67ADB}" type="datetime1">
               <a:rPr lang="en-SG" smtClean="0"/>
-              <a:t>10/10/15</a:t>
+              <a:t>4/11/15</a:t>
             </a:fld>
             <a:endParaRPr lang="en-US"/>
           </a:p>
@@ -6008,7 +6224,7 @@
           <a:p>
             <a:fld id="{7D860D0A-92BF-2949-B457-A3379F310A5C}" type="datetime1">
               <a:rPr lang="en-SG" smtClean="0"/>
-              <a:t>10/10/15</a:t>
+              <a:t>4/11/15</a:t>
             </a:fld>
             <a:endParaRPr lang="en-US"/>
           </a:p>
@@ -6140,7 +6356,7 @@
         </p:spPr>
         <p:txBody>
           <a:bodyPr>
-            <a:normAutofit lnSpcReduction="10000"/>
+            <a:normAutofit/>
           </a:bodyPr>
           <a:lstStyle/>
           <a:p>
@@ -6180,56 +6396,105 @@
               <a:buNone/>
             </a:pPr>
             <a:r>
-              <a:rPr lang="en-US" dirty="0" smtClean="0"/>
-              <a:t>data node{</a:t>
+              <a:rPr lang="en-US" sz="2800" dirty="0" err="1"/>
+              <a:t>s</a:t>
+            </a:r>
+            <a:r>
+              <a:rPr lang="en-US" sz="2800" dirty="0" err="1" smtClean="0"/>
+              <a:t>truct</a:t>
+            </a:r>
+            <a:r>
+              <a:rPr lang="en-US" sz="2800" dirty="0" smtClean="0"/>
+              <a:t> node</a:t>
+            </a:r>
+            <a:r>
+              <a:rPr lang="en-US" sz="2800" dirty="0" smtClean="0"/>
+              <a:t>{</a:t>
             </a:r>
             <a:br>
-              <a:rPr lang="en-US" dirty="0" smtClean="0"/>
+              <a:rPr lang="en-US" sz="2800" dirty="0" smtClean="0"/>
             </a:br>
             <a:r>
-              <a:rPr lang="en-US" dirty="0" err="1" smtClean="0"/>
+              <a:rPr lang="en-US" sz="2800" dirty="0" err="1" smtClean="0"/>
               <a:t>int</a:t>
             </a:r>
             <a:r>
-              <a:rPr lang="en-US" dirty="0" smtClean="0"/>
+              <a:rPr lang="en-US" sz="2800" dirty="0" smtClean="0"/>
               <a:t> </a:t>
             </a:r>
             <a:r>
-              <a:rPr lang="en-US" dirty="0" err="1" smtClean="0"/>
+              <a:rPr lang="en-US" sz="2800" dirty="0" err="1" smtClean="0"/>
               <a:t>val</a:t>
             </a:r>
             <a:r>
-              <a:rPr lang="en-US" dirty="0" smtClean="0"/>
+              <a:rPr lang="en-US" sz="2800" dirty="0" smtClean="0"/>
               <a:t>;</a:t>
             </a:r>
             <a:br>
-              <a:rPr lang="en-US" dirty="0" smtClean="0"/>
+              <a:rPr lang="en-US" sz="2800" dirty="0" smtClean="0"/>
             </a:br>
             <a:r>
-              <a:rPr lang="en-US" dirty="0" smtClean="0"/>
-              <a:t>node next;</a:t>
+              <a:rPr lang="en-US" sz="2800" dirty="0" err="1" smtClean="0"/>
+              <a:t>struct</a:t>
+            </a:r>
+            <a:r>
+              <a:rPr lang="en-US" sz="2800" dirty="0" smtClean="0"/>
+              <a:t> node* </a:t>
+            </a:r>
+            <a:r>
+              <a:rPr lang="en-US" sz="2800" dirty="0" smtClean="0"/>
+              <a:t>next;</a:t>
             </a:r>
             <a:br>
-              <a:rPr lang="en-US" dirty="0" smtClean="0"/>
+              <a:rPr lang="en-US" sz="2800" dirty="0" smtClean="0"/>
             </a:br>
             <a:r>
-              <a:rPr lang="en-US" dirty="0" smtClean="0"/>
-              <a:t>node parent;</a:t>
+              <a:rPr lang="en-US" sz="2800" dirty="0" err="1" smtClean="0"/>
+              <a:t>struct</a:t>
+            </a:r>
+            <a:r>
+              <a:rPr lang="en-US" sz="2800" dirty="0" smtClean="0"/>
+              <a:t> node* </a:t>
+            </a:r>
+            <a:r>
+              <a:rPr lang="en-US" sz="2800" dirty="0" smtClean="0"/>
+              <a:t>parent;</a:t>
             </a:r>
             <a:br>
-              <a:rPr lang="en-US" dirty="0" smtClean="0"/>
+              <a:rPr lang="en-US" sz="2800" dirty="0" smtClean="0"/>
             </a:br>
             <a:r>
-              <a:rPr lang="en-US" dirty="0" smtClean="0"/>
-              <a:t>node left;</a:t>
+              <a:rPr lang="en-US" sz="2800" dirty="0" err="1" smtClean="0"/>
+              <a:t>struct</a:t>
+            </a:r>
+            <a:r>
+              <a:rPr lang="en-US" sz="2800" dirty="0" smtClean="0"/>
+              <a:t> node* </a:t>
+            </a:r>
+            <a:r>
+              <a:rPr lang="en-US" sz="2800" dirty="0" smtClean="0"/>
+              <a:t>left;</a:t>
             </a:r>
             <a:br>
-              <a:rPr lang="en-US" dirty="0" smtClean="0"/>
+              <a:rPr lang="en-US" sz="2800" dirty="0" smtClean="0"/>
             </a:br>
             <a:r>
-              <a:rPr lang="en-US" dirty="0" smtClean="0"/>
-              <a:t>node right;}</a:t>
-            </a:r>
+              <a:rPr lang="en-US" sz="2800" dirty="0" err="1" smtClean="0"/>
+              <a:t>struct</a:t>
+            </a:r>
+            <a:r>
+              <a:rPr lang="en-US" sz="2800" dirty="0" smtClean="0"/>
+              <a:t> node* </a:t>
+            </a:r>
+            <a:r>
+              <a:rPr lang="en-US" sz="2800" dirty="0" smtClean="0"/>
+              <a:t>right;</a:t>
+            </a:r>
+            <a:r>
+              <a:rPr lang="en-US" sz="2800" dirty="0" smtClean="0"/>
+              <a:t>};</a:t>
+            </a:r>
+            <a:endParaRPr lang="en-US" sz="2800" dirty="0" smtClean="0"/>
           </a:p>
         </p:txBody>
       </p:sp>
@@ -7247,7 +7512,7 @@
           <a:p>
             <a:fld id="{C369C776-9F4F-F545-B5D4-15371A6096C0}" type="datetime1">
               <a:rPr lang="en-SG" smtClean="0"/>
-              <a:t>10/10/15</a:t>
+              <a:t>4/11/15</a:t>
             </a:fld>
             <a:endParaRPr lang="en-US"/>
           </a:p>
@@ -7385,32 +7650,44 @@
               <a:buNone/>
             </a:pPr>
             <a:r>
-              <a:rPr lang="en-US" sz="1600" dirty="0"/>
-              <a:t>Lee, </a:t>
-            </a:r>
-            <a:r>
-              <a:rPr lang="en-US" sz="1600" dirty="0" err="1"/>
+              <a:rPr lang="en-US" sz="1600" dirty="0" err="1" smtClean="0"/>
               <a:t>Oukseh</a:t>
+            </a:r>
+            <a:r>
+              <a:rPr lang="en-US" sz="1600" dirty="0" smtClean="0"/>
+              <a:t> Lee</a:t>
             </a:r>
             <a:r>
               <a:rPr lang="en-US" sz="1600" dirty="0"/>
               <a:t>, </a:t>
             </a:r>
             <a:r>
-              <a:rPr lang="en-US" sz="1600" dirty="0" err="1"/>
+              <a:rPr lang="en-US" sz="1600" dirty="0" err="1" smtClean="0"/>
               <a:t>Hongseok</a:t>
             </a:r>
             <a:r>
+              <a:rPr lang="en-US" sz="1600" dirty="0" smtClean="0"/>
+              <a:t> Yang and </a:t>
+            </a:r>
+            <a:r>
+              <a:rPr lang="en-US" sz="1600" dirty="0" err="1" smtClean="0"/>
+              <a:t>Rasmus</a:t>
+            </a:r>
+            <a:r>
+              <a:rPr lang="en-US" sz="1600" dirty="0" smtClean="0"/>
+              <a:t> </a:t>
+            </a:r>
+            <a:r>
               <a:rPr lang="en-US" sz="1600" dirty="0"/>
-              <a:t> Yang, and </a:t>
-            </a:r>
-            <a:r>
-              <a:rPr lang="en-US" sz="1600" dirty="0" err="1"/>
-              <a:t>Rasmus</a:t>
+              <a:t>Petersen</a:t>
+            </a:r>
+            <a:r>
+              <a:rPr lang="en-US" sz="1600" dirty="0" smtClean="0"/>
+              <a:t>. </a:t>
             </a:r>
             <a:r>
               <a:rPr lang="en-US" sz="1600" dirty="0"/>
-              <a:t> Petersen. "Program analysis for overlaid data structures." Computer Aided Verification. Springer Berlin Heidelberg, </a:t>
+              <a:t>"Program analysis for overlaid data structures." Computer Aided Verification. Springer Berlin Heidelberg, </a:t>
             </a:r>
             <a:r>
               <a:rPr lang="en-US" sz="1600" dirty="0" smtClean="0"/>
@@ -7422,16 +7699,16 @@
               <a:buNone/>
             </a:pPr>
             <a:r>
+              <a:rPr lang="en-US" sz="1600" dirty="0" err="1" smtClean="0"/>
+              <a:t>Cezara</a:t>
+            </a:r>
+            <a:r>
+              <a:rPr lang="en-US" sz="1600" dirty="0"/>
+              <a:t> </a:t>
+            </a:r>
+            <a:r>
               <a:rPr lang="en-US" sz="1600" dirty="0" err="1"/>
               <a:t>Drăgoi</a:t>
-            </a:r>
-            <a:r>
-              <a:rPr lang="en-US" sz="1600" dirty="0"/>
-              <a:t>, </a:t>
-            </a:r>
-            <a:r>
-              <a:rPr lang="en-US" sz="1600" dirty="0" err="1"/>
-              <a:t>Cezara</a:t>
             </a:r>
             <a:r>
               <a:rPr lang="en-US" sz="1600" dirty="0"/>
@@ -8160,7 +8437,7 @@
           <a:p>
             <a:fld id="{E690F8F4-367F-924D-9410-DE1B16B44EDC}" type="datetime1">
               <a:rPr lang="en-SG" smtClean="0"/>
-              <a:t>10/10/15</a:t>
+              <a:t>4/11/15</a:t>
             </a:fld>
             <a:endParaRPr lang="en-US"/>
           </a:p>
@@ -8284,7 +8561,9 @@
         </p:nvSpPr>
         <p:spPr/>
         <p:txBody>
-          <a:bodyPr/>
+          <a:bodyPr>
+            <a:normAutofit lnSpcReduction="10000"/>
+          </a:bodyPr>
           <a:lstStyle/>
           <a:p>
             <a:r>
@@ -8305,8 +8584,26 @@
             </a:r>
             <a:r>
               <a:rPr lang="en-US" dirty="0" smtClean="0"/>
-              <a:t> Tool</a:t>
-            </a:r>
+              <a:t> </a:t>
+            </a:r>
+            <a:r>
+              <a:rPr lang="en-US" dirty="0" smtClean="0"/>
+              <a:t>Tool</a:t>
+            </a:r>
+          </a:p>
+          <a:p>
+            <a:pPr lvl="1"/>
+            <a:r>
+              <a:rPr lang="en-US" dirty="0">
+                <a:hlinkClick r:id="rId2"/>
+              </a:rPr>
+              <a:t>http://loris-7.ddns.comp.nus.edu.sg/~project/HIPComp/</a:t>
+            </a:r>
+            <a:r>
+              <a:rPr lang="en-US" dirty="0"/>
+              <a:t> </a:t>
+            </a:r>
+            <a:endParaRPr lang="en-US" dirty="0" smtClean="0"/>
           </a:p>
           <a:p>
             <a:pPr lvl="1"/>
@@ -8334,7 +8631,7 @@
           <a:p>
             <a:fld id="{6369BB91-09DC-7049-B813-D3C0252D4D51}" type="datetime1">
               <a:rPr lang="en-SG" smtClean="0"/>
-              <a:t>10/10/15</a:t>
+              <a:t>5/11/15</a:t>
             </a:fld>
             <a:endParaRPr lang="en-US"/>
           </a:p>
@@ -8481,14 +8778,30 @@
             </a:r>
             <a:r>
               <a:rPr lang="en-US" dirty="0" smtClean="0"/>
-              <a:t>&lt;S&gt; == root = null &amp; S = {}</a:t>
+              <a:t>&lt;S&gt; == </a:t>
+            </a:r>
+            <a:r>
+              <a:rPr lang="en-US" dirty="0" smtClean="0"/>
+              <a:t>self = </a:t>
+            </a:r>
+            <a:r>
+              <a:rPr lang="en-US" dirty="0" smtClean="0"/>
+              <a:t>null &amp; S = {}</a:t>
             </a:r>
             <a:br>
               <a:rPr lang="en-US" dirty="0" smtClean="0"/>
             </a:br>
             <a:r>
               <a:rPr lang="en-US" dirty="0" smtClean="0"/>
-              <a:t>           or root::node&lt;_@</a:t>
+              <a:t>           or </a:t>
+            </a:r>
+            <a:r>
+              <a:rPr lang="en-US" dirty="0" smtClean="0"/>
+              <a:t>self:</a:t>
+            </a:r>
+            <a:r>
+              <a:rPr lang="en-US" dirty="0" smtClean="0"/>
+              <a:t>:node&lt;_@</a:t>
             </a:r>
             <a:r>
               <a:rPr lang="en-US" dirty="0" err="1"/>
@@ -8541,7 +8854,15 @@
             </a:r>
             <a:r>
               <a:rPr lang="en-US" dirty="0" smtClean="0"/>
-              <a:t> U {root}</a:t>
+              <a:t> U </a:t>
+            </a:r>
+            <a:r>
+              <a:rPr lang="en-US" dirty="0" smtClean="0"/>
+              <a:t>{self}</a:t>
+            </a:r>
+            <a:r>
+              <a:rPr lang="en-US" dirty="0" smtClean="0"/>
+              <a:t/>
             </a:r>
             <a:br>
               <a:rPr lang="en-US" dirty="0" smtClean="0"/>
@@ -8562,14 +8883,30 @@
             </a:r>
             <a:r>
               <a:rPr lang="en-US" dirty="0" smtClean="0"/>
-              <a:t>&gt; == root = null &amp; S = {}</a:t>
+              <a:t>&gt; == </a:t>
+            </a:r>
+            <a:r>
+              <a:rPr lang="en-US" dirty="0" smtClean="0"/>
+              <a:t>self = </a:t>
+            </a:r>
+            <a:r>
+              <a:rPr lang="en-US" dirty="0" smtClean="0"/>
+              <a:t>null &amp; S = {}</a:t>
             </a:r>
             <a:br>
               <a:rPr lang="en-US" dirty="0" smtClean="0"/>
             </a:br>
             <a:r>
               <a:rPr lang="en-US" dirty="0" smtClean="0"/>
-              <a:t>            	   or root::node&lt;_@I,_@</a:t>
+              <a:t>            	   or </a:t>
+            </a:r>
+            <a:r>
+              <a:rPr lang="en-US" dirty="0" smtClean="0"/>
+              <a:t>self:</a:t>
+            </a:r>
+            <a:r>
+              <a:rPr lang="en-US" dirty="0" smtClean="0"/>
+              <a:t>:node&lt;_@I,_@</a:t>
             </a:r>
             <a:r>
               <a:rPr lang="en-US" dirty="0" err="1" smtClean="0"/>
@@ -8590,19 +8927,35 @@
             </a:r>
             <a:r>
               <a:rPr lang="en-US" dirty="0" smtClean="0"/>
-              <a:t>           	        * l::tree&lt;</a:t>
+              <a:t>           	        * l::tree</a:t>
+            </a:r>
+            <a:r>
+              <a:rPr lang="en-US" dirty="0" smtClean="0"/>
+              <a:t>&lt;</a:t>
             </a:r>
             <a:r>
               <a:rPr lang="en-US" dirty="0" err="1" smtClean="0"/>
-              <a:t>root,Sl</a:t>
+              <a:t>self,</a:t>
+            </a:r>
+            <a:r>
+              <a:rPr lang="en-US" dirty="0" err="1" smtClean="0"/>
+              <a:t>Sl</a:t>
             </a:r>
             <a:r>
               <a:rPr lang="en-US" dirty="0" smtClean="0"/>
-              <a:t>&gt; * r::tree&lt;</a:t>
+              <a:t>&gt; * r::tree</a:t>
+            </a:r>
+            <a:r>
+              <a:rPr lang="en-US" dirty="0" smtClean="0"/>
+              <a:t>&lt;</a:t>
             </a:r>
             <a:r>
               <a:rPr lang="en-US" dirty="0" err="1" smtClean="0"/>
-              <a:t>root,Sr</a:t>
+              <a:t>self,</a:t>
+            </a:r>
+            <a:r>
+              <a:rPr lang="en-US" dirty="0" err="1" smtClean="0"/>
+              <a:t>Sr</a:t>
             </a:r>
             <a:r>
               <a:rPr lang="en-US" dirty="0" smtClean="0"/>
@@ -8639,7 +8992,15 @@
             </a:r>
             <a:r>
               <a:rPr lang="en-US" dirty="0" smtClean="0"/>
-              <a:t>  U {root}</a:t>
+              <a:t>  U </a:t>
+            </a:r>
+            <a:r>
+              <a:rPr lang="en-US" dirty="0" smtClean="0"/>
+              <a:t>{self}</a:t>
+            </a:r>
+            <a:r>
+              <a:rPr lang="en-US" dirty="0" smtClean="0"/>
+              <a:t/>
             </a:r>
             <a:br>
               <a:rPr lang="en-US" dirty="0" smtClean="0"/>
@@ -8828,7 +9189,7 @@
           <a:p>
             <a:fld id="{204DE5AF-4F76-EA4D-8E7E-52F08C16A60B}" type="datetime1">
               <a:rPr lang="en-SG" smtClean="0"/>
-              <a:t>10/10/15</a:t>
+              <a:t>4/11/15</a:t>
             </a:fld>
             <a:endParaRPr lang="en-US"/>
           </a:p>
@@ -9065,7 +9426,7 @@
         </p:nvSpPr>
         <p:spPr>
           <a:xfrm>
-            <a:off x="651164" y="3726873"/>
+            <a:off x="651164" y="3965798"/>
             <a:ext cx="5126182" cy="2246769"/>
           </a:xfrm>
           <a:prstGeom prst="rect">
@@ -9139,6 +9500,12 @@
             </a:r>
           </a:p>
           <a:p>
+            <a:r>
+              <a:rPr lang="is-IS" sz="2000" dirty="0" smtClean="0"/>
+              <a:t>…</a:t>
+            </a:r>
+          </a:p>
+          <a:p>
             <a:endParaRPr lang="en-US" sz="2000" dirty="0"/>
           </a:p>
           <a:p>
@@ -9176,46 +9543,7 @@
                   <a:schemeClr val="accent3"/>
                 </a:solidFill>
               </a:rPr>
-              <a:t>(node&lt;@I,@M&gt;)</a:t>
-            </a:r>
-            <a:r>
-              <a:rPr lang="en-US" sz="2000" dirty="0"/>
-              <a:t/>
-            </a:r>
-            <a:br>
-              <a:rPr lang="en-US" sz="2000" dirty="0"/>
-            </a:br>
-            <a:r>
-              <a:rPr lang="en-US" sz="2000" dirty="0" err="1"/>
-              <a:t>XMem</a:t>
-            </a:r>
-            <a:r>
-              <a:rPr lang="en-US" sz="2000" dirty="0"/>
-              <a:t>(x::</a:t>
-            </a:r>
-            <a:r>
-              <a:rPr lang="en-US" sz="2000" dirty="0" err="1"/>
-              <a:t>ll</a:t>
-            </a:r>
-            <a:r>
-              <a:rPr lang="en-US" sz="2000" dirty="0" smtClean="0"/>
-              <a:t>&lt;S&gt;</a:t>
-            </a:r>
-            <a:r>
-              <a:rPr lang="en-US" sz="2000" dirty="0"/>
-              <a:t>) = </a:t>
-            </a:r>
-            <a:r>
-              <a:rPr lang="en-US" sz="2000" dirty="0">
-                <a:solidFill>
-                  <a:schemeClr val="accent1"/>
-                </a:solidFill>
-              </a:rPr>
-              <a:t>S</a:t>
-            </a:r>
-            <a:r>
-              <a:rPr lang="en-US" sz="2000" dirty="0" smtClean="0"/>
-              <a:t>-&gt;</a:t>
+              <a:t>(node&lt;@I,@M&gt;</a:t>
             </a:r>
             <a:r>
               <a:rPr lang="en-US" sz="2000" dirty="0" smtClean="0">
@@ -9223,8 +9551,13 @@
                   <a:schemeClr val="accent3"/>
                 </a:solidFill>
               </a:rPr>
-              <a:t>()</a:t>
-            </a:r>
+              <a:t>)</a:t>
+            </a:r>
+            <a:endParaRPr lang="en-US" sz="2000" dirty="0" smtClean="0">
+              <a:solidFill>
+                <a:schemeClr val="accent3"/>
+              </a:solidFill>
+            </a:endParaRPr>
           </a:p>
         </p:txBody>
       </p:sp>
@@ -9237,7 +9570,7 @@
         <p:spPr>
           <a:xfrm>
             <a:off x="685800" y="1458824"/>
-            <a:ext cx="3962401" cy="1938992"/>
+            <a:ext cx="3962401" cy="2677656"/>
           </a:xfrm>
           <a:prstGeom prst="rect">
             <a:avLst/>
@@ -9306,8 +9639,15 @@
             </a:r>
             <a:r>
               <a:rPr lang="en-US" sz="2400" dirty="0" smtClean="0"/>
-              <a:t> is the list of field annotations</a:t>
-            </a:r>
+              <a:t> is the list of field </a:t>
+            </a:r>
+            <a:r>
+              <a:rPr lang="en-US" sz="2400" dirty="0" smtClean="0"/>
+              <a:t>annotations</a:t>
+            </a:r>
+          </a:p>
+          <a:p>
+            <a:pPr algn="ctr"/>
             <a:endParaRPr lang="en-US" sz="2400" dirty="0"/>
           </a:p>
         </p:txBody>
@@ -9579,14 +9919,14 @@
           <p:nvPr>
             <p:extLst>
               <p:ext uri="{D42A27DB-BD31-4B8C-83A1-F6EECF244321}">
-                <p14:modId xmlns:p14="http://schemas.microsoft.com/office/powerpoint/2010/main" val="3316066916"/>
+                <p14:modId xmlns:p14="http://schemas.microsoft.com/office/powerpoint/2010/main" val="3154537996"/>
               </p:ext>
             </p:extLst>
           </p:nvPr>
         </p:nvGraphicFramePr>
         <p:xfrm>
           <a:off x="6629400" y="4343400"/>
-          <a:ext cx="1981200" cy="1463040"/>
+          <a:ext cx="1981200" cy="1828800"/>
         </p:xfrm>
         <a:graphic>
           <a:graphicData uri="http://schemas.openxmlformats.org/drawingml/2006/table">
@@ -9718,6 +10058,36 @@
                   <a:tcPr/>
                 </a:tc>
               </a:tr>
+              <a:tr h="350232">
+                <a:tc>
+                  <a:txBody>
+                    <a:bodyPr/>
+                    <a:lstStyle/>
+                    <a:p>
+                      <a:r>
+                        <a:rPr lang="en-US" dirty="0" smtClean="0"/>
+                        <a:t>@A</a:t>
+                      </a:r>
+                      <a:endParaRPr lang="en-US" dirty="0"/>
+                    </a:p>
+                  </a:txBody>
+                  <a:tcPr/>
+                </a:tc>
+                <a:tc>
+                  <a:txBody>
+                    <a:bodyPr/>
+                    <a:lstStyle/>
+                    <a:p>
+                      <a:r>
+                        <a:rPr lang="en-US" dirty="0" smtClean="0"/>
+                        <a:t>@A</a:t>
+                      </a:r>
+                      <a:endParaRPr lang="en-US" dirty="0"/>
+                    </a:p>
+                  </a:txBody>
+                  <a:tcPr/>
+                </a:tc>
+              </a:tr>
             </a:tbl>
           </a:graphicData>
         </a:graphic>
@@ -9739,7 +10109,7 @@
           <a:p>
             <a:fld id="{9DEA4400-211C-4C45-BCD3-9B4BC5D39E06}" type="datetime1">
               <a:rPr lang="en-SG" smtClean="0"/>
-              <a:t>10/10/15</a:t>
+              <a:t>5/11/15</a:t>
             </a:fld>
             <a:endParaRPr lang="en-US"/>
           </a:p>
@@ -10267,7 +10637,7 @@
           <a:p>
             <a:fld id="{1AA8C59A-0B9D-714E-9731-F2CA1E88AE2A}" type="datetime1">
               <a:rPr lang="en-SG" smtClean="0"/>
-              <a:t>10/10/15</a:t>
+              <a:t>4/11/15</a:t>
             </a:fld>
             <a:endParaRPr lang="en-US"/>
           </a:p>
@@ -10868,7 +11238,7 @@
           <a:p>
             <a:fld id="{667D34EF-ED91-B44E-ADDC-294041380476}" type="datetime1">
               <a:rPr lang="en-SG" smtClean="0"/>
-              <a:t>10/10/15</a:t>
+              <a:t>4/11/15</a:t>
             </a:fld>
             <a:endParaRPr lang="en-US"/>
           </a:p>
@@ -11128,7 +11498,7 @@
             </a:r>
             <a:r>
               <a:rPr lang="en-US" sz="2400" dirty="0" smtClean="0"/>
-              <a:t>q1s</a:t>
+              <a:t>(q1s</a:t>
             </a:r>
             <a:r>
               <a:rPr lang="en-US" sz="2400" dirty="0"/>
@@ -11148,7 +11518,15 @@
             </a:r>
             <a:r>
               <a:rPr lang="en-US" sz="2400" dirty="0"/>
-              <a:t>q1t::tree&lt;_,S&gt; * q2::</a:t>
+              <a:t>q1t::tree&lt;_,S</a:t>
+            </a:r>
+            <a:r>
+              <a:rPr lang="en-US" sz="2400" dirty="0" smtClean="0"/>
+              <a:t>&gt;) </a:t>
+            </a:r>
+            <a:r>
+              <a:rPr lang="en-US" sz="2400" dirty="0"/>
+              <a:t>* q2::</a:t>
             </a:r>
             <a:r>
               <a:rPr lang="en-US" sz="2400" dirty="0" err="1"/>
@@ -11175,7 +11553,15 @@
             </a:r>
             <a:r>
               <a:rPr lang="en-US" sz="2400" dirty="0" smtClean="0"/>
-              <a:t> q1s:</a:t>
+              <a:t> </a:t>
+            </a:r>
+            <a:r>
+              <a:rPr lang="en-US" sz="2400" dirty="0" smtClean="0"/>
+              <a:t>(q1s</a:t>
+            </a:r>
+            <a:r>
+              <a:rPr lang="en-US" sz="2400" dirty="0" smtClean="0"/>
+              <a:t>:</a:t>
             </a:r>
             <a:r>
               <a:rPr lang="en-US" sz="2400" dirty="0"/>
@@ -11210,8 +11596,12 @@
               <a:t>u</a:t>
             </a:r>
             <a:r>
+              <a:rPr lang="en-US" sz="2400" dirty="0" smtClean="0"/>
+              <a:t>&gt;) </a:t>
+            </a:r>
+            <a:r>
               <a:rPr lang="en-US" sz="2400" dirty="0"/>
-              <a:t>&gt; * </a:t>
+              <a:t>* </a:t>
             </a:r>
             <a:r>
               <a:rPr lang="en-US" sz="2400" dirty="0" smtClean="0"/>
@@ -11456,7 +11846,7 @@
           <a:p>
             <a:fld id="{7F770E69-B63C-E743-9955-FD71BE6C0BC7}" type="datetime1">
               <a:rPr lang="en-SG" smtClean="0"/>
-              <a:t>10/10/15</a:t>
+              <a:t>4/11/15</a:t>
             </a:fld>
             <a:endParaRPr lang="en-US"/>
           </a:p>
@@ -11982,7 +12372,7 @@
           <a:p>
             <a:fld id="{B0ECE607-8E43-144B-BD66-8A0B9FA5A4E9}" type="datetime1">
               <a:rPr lang="en-SG" smtClean="0"/>
-              <a:t>10/10/15</a:t>
+              <a:t>4/11/15</a:t>
             </a:fld>
             <a:endParaRPr lang="en-US"/>
           </a:p>
@@ -12526,7 +12916,7 @@
           <a:p>
             <a:fld id="{CD68A4BB-6243-5A4D-B575-BE76C3EEDD60}" type="datetime1">
               <a:rPr lang="en-SG" smtClean="0"/>
-              <a:t>10/10/15</a:t>
+              <a:t>4/11/15</a:t>
             </a:fld>
             <a:endParaRPr lang="en-US"/>
           </a:p>
@@ -12632,7 +13022,7 @@
           <a:p>
             <a:r>
               <a:rPr lang="en-US" dirty="0" smtClean="0"/>
-              <a:t>Correctness</a:t>
+              <a:t>Coq Development</a:t>
             </a:r>
             <a:endParaRPr lang="en-US" dirty="0"/>
           </a:p>
@@ -12758,7 +13148,7 @@
           <a:p>
             <a:fld id="{1ABA7FF9-3FEC-6740-BCC2-FB5B6EA92391}" type="datetime1">
               <a:rPr lang="en-SG" smtClean="0"/>
-              <a:t>10/10/15</a:t>
+              <a:t>4/11/15</a:t>
             </a:fld>
             <a:endParaRPr lang="en-US"/>
           </a:p>
@@ -12864,7 +13254,7 @@
           <a:p>
             <a:r>
               <a:rPr lang="en-US" dirty="0" smtClean="0"/>
-              <a:t>Expressivity (and Performance)</a:t>
+              <a:t>Experiments</a:t>
             </a:r>
             <a:endParaRPr lang="en-US" dirty="0"/>
           </a:p>
@@ -13555,7 +13945,7 @@
           <a:p>
             <a:fld id="{3BEE7D4A-C63E-A44F-964C-C6FFED44BA2E}" type="datetime1">
               <a:rPr lang="en-SG" smtClean="0"/>
-              <a:t>10/10/15</a:t>
+              <a:t>4/11/15</a:t>
             </a:fld>
             <a:endParaRPr lang="en-US"/>
           </a:p>
@@ -13737,7 +14127,7 @@
           <a:p>
             <a:fld id="{C3F0980A-268F-F14D-A251-4409AF1E58A0}" type="datetime1">
               <a:rPr lang="en-SG" smtClean="0"/>
-              <a:t>10/10/15</a:t>
+              <a:t>4/11/15</a:t>
             </a:fld>
             <a:endParaRPr lang="en-US"/>
           </a:p>
@@ -13843,7 +14233,11 @@
           <a:p>
             <a:r>
               <a:rPr lang="en-US" dirty="0" smtClean="0"/>
-              <a:t>Thank You !</a:t>
+              <a:t>Thank </a:t>
+            </a:r>
+            <a:r>
+              <a:rPr lang="en-US" dirty="0" smtClean="0"/>
+              <a:t>You!</a:t>
             </a:r>
             <a:endParaRPr lang="en-US" dirty="0"/>
           </a:p>
@@ -13868,7 +14262,7 @@
           <a:p>
             <a:r>
               <a:rPr lang="en-US" dirty="0" smtClean="0"/>
-              <a:t>Questions ?</a:t>
+              <a:t>Questions?</a:t>
             </a:r>
           </a:p>
           <a:p>
@@ -13876,6 +14270,7 @@
               <a:rPr lang="en-US" dirty="0" smtClean="0"/>
               <a:t>Contact</a:t>
             </a:r>
+            <a:endParaRPr lang="en-US" dirty="0" smtClean="0"/>
           </a:p>
           <a:p>
             <a:pPr lvl="1"/>
@@ -13929,7 +14324,7 @@
           <a:p>
             <a:fld id="{A2FEE624-2C80-1A47-8DD3-BA8C23A019B5}" type="datetime1">
               <a:rPr lang="en-SG" smtClean="0"/>
-              <a:t>10/10/15</a:t>
+              <a:t>5/11/15</a:t>
             </a:fld>
             <a:endParaRPr lang="en-US"/>
           </a:p>
@@ -14118,7 +14513,7 @@
           <a:p>
             <a:fld id="{502A57F2-8AAA-4646-A372-732CF6177523}" type="datetime1">
               <a:rPr lang="en-SG" smtClean="0"/>
-              <a:t>10/10/15</a:t>
+              <a:t>4/11/15</a:t>
             </a:fld>
             <a:endParaRPr lang="en-US"/>
           </a:p>
@@ -16593,7 +16988,7 @@
           <a:p>
             <a:fld id="{6918E020-D9E5-6246-A073-733864963C8D}" type="datetime1">
               <a:rPr lang="en-SG" smtClean="0"/>
-              <a:t>10/10/15</a:t>
+              <a:t>4/11/15</a:t>
             </a:fld>
             <a:endParaRPr lang="en-US"/>
           </a:p>
@@ -16856,7 +17251,7 @@
           <a:p>
             <a:fld id="{8842D9B0-6DEC-BC4C-82D7-3C8F8C7C66DB}" type="datetime1">
               <a:rPr lang="en-SG" smtClean="0"/>
-              <a:t>10/10/15</a:t>
+              <a:t>4/11/15</a:t>
             </a:fld>
             <a:endParaRPr lang="en-US"/>
           </a:p>
@@ -19353,8 +19748,8 @@
           </p:txBody>
         </p:sp>
       </p:grpSp>
-      <mc:AlternateContent xmlns:mc="http://schemas.openxmlformats.org/markup-compatibility/2006" xmlns:a14="http://schemas.microsoft.com/office/drawing/2010/main">
-        <mc:Choice Requires="a14">
+      <mc:AlternateContent xmlns:mc="http://schemas.openxmlformats.org/markup-compatibility/2006">
+        <mc:Choice xmlns:a14="http://schemas.microsoft.com/office/drawing/2010/main" Requires="a14">
           <p:sp>
             <p:nvSpPr>
               <p:cNvPr id="59" name="Text Box 7"/>
@@ -19365,7 +19760,7 @@
             </p:nvSpPr>
             <p:spPr bwMode="auto">
               <a:xfrm>
-                <a:off x="915988" y="3990254"/>
+                <a:off x="1361903" y="3901354"/>
                 <a:ext cx="7086600" cy="1077218"/>
               </a:xfrm>
               <a:prstGeom prst="rect">
@@ -19721,7 +20116,7 @@
             </p:txBody>
           </p:sp>
         </mc:Choice>
-        <mc:Fallback xmlns="">
+        <mc:Fallback>
           <p:sp>
             <p:nvSpPr>
               <p:cNvPr id="59" name="Text Box 7"/>
@@ -19732,7 +20127,7 @@
             </p:nvSpPr>
             <p:spPr bwMode="auto">
               <a:xfrm>
-                <a:off x="915988" y="3990254"/>
+                <a:off x="1361903" y="3901354"/>
                 <a:ext cx="7086600" cy="1077218"/>
               </a:xfrm>
               <a:prstGeom prst="rect">
@@ -19741,21 +20136,21 @@
               <a:blipFill rotWithShape="1">
                 <a:blip r:embed="rId2"/>
                 <a:stretch>
-                  <a:fillRect l="-2150" t="-8523" b="-18750"/>
+                  <a:fillRect b="-5618"/>
                 </a:stretch>
               </a:blipFill>
               <a:ln>
                 <a:noFill/>
               </a:ln>
               <a:extLst>
-                <a:ext uri="{909E8E84-426E-40DD-AFC4-6F175D3DCCD1}">
+                <a:ext uri="{909E8E84-426E-40dd-AFC4-6F175D3DCCD1}">
                   <a14:hiddenFill xmlns:a14="http://schemas.microsoft.com/office/drawing/2010/main">
                     <a:solidFill>
                       <a:srgbClr val="FFFFFF"/>
                     </a:solidFill>
                   </a14:hiddenFill>
                 </a:ext>
-                <a:ext uri="{91240B29-F687-4F45-9708-019B960494DF}">
+                <a:ext uri="{91240B29-F687-4f45-9708-019B960494DF}">
                   <a14:hiddenLine xmlns:a14="http://schemas.microsoft.com/office/drawing/2010/main" w="9525">
                     <a:solidFill>
                       <a:srgbClr val="000000"/>
@@ -19977,7 +20372,7 @@
           <a:p>
             <a:fld id="{86D63118-CD2A-9649-B5EC-6AAA7E4EE4D4}" type="datetime1">
               <a:rPr lang="en-SG" smtClean="0"/>
-              <a:t>10/10/15</a:t>
+              <a:t>4/11/15</a:t>
             </a:fld>
             <a:endParaRPr lang="en-US"/>
           </a:p>
@@ -20668,9 +21063,9 @@
         </p:nvGrpSpPr>
         <p:grpSpPr bwMode="auto">
           <a:xfrm>
-            <a:off x="912812" y="3047998"/>
+            <a:off x="722312" y="3047998"/>
             <a:ext cx="7086600" cy="2525018"/>
-            <a:chOff x="1095375" y="3048000"/>
+            <a:chOff x="904875" y="3048000"/>
             <a:chExt cx="7086600" cy="2525018"/>
           </a:xfrm>
         </p:grpSpPr>
@@ -20684,7 +21079,7 @@
           </p:nvSpPr>
           <p:spPr bwMode="auto">
             <a:xfrm>
-              <a:off x="1095375" y="4495800"/>
+              <a:off x="904875" y="4495800"/>
               <a:ext cx="7086600" cy="1077218"/>
             </a:xfrm>
             <a:prstGeom prst="rect">
@@ -21080,7 +21475,7 @@
         </p:nvGrpSpPr>
         <p:grpSpPr bwMode="auto">
           <a:xfrm>
-            <a:off x="3624698" y="5573018"/>
+            <a:off x="3317104" y="5573018"/>
             <a:ext cx="4210768" cy="947856"/>
             <a:chOff x="3657600" y="5196197"/>
             <a:chExt cx="4211251" cy="948530"/>
@@ -21360,7 +21755,7 @@
           <a:p>
             <a:fld id="{73E074C7-DBE0-0F41-BADE-A07B965CE4C7}" type="datetime1">
               <a:rPr lang="en-SG" smtClean="0"/>
-              <a:t>10/10/15</a:t>
+              <a:t>4/11/15</a:t>
             </a:fld>
             <a:endParaRPr lang="en-US"/>
           </a:p>
@@ -21908,7 +22303,7 @@
           <a:p>
             <a:fld id="{23F6C8B2-7CC1-BC47-9500-5126A822121C}" type="datetime1">
               <a:rPr lang="en-SG" smtClean="0"/>
-              <a:t>10/10/15</a:t>
+              <a:t>4/11/15</a:t>
             </a:fld>
             <a:endParaRPr lang="en-US"/>
           </a:p>
@@ -25497,7 +25892,7 @@
           <a:p>
             <a:fld id="{5F2EA5F6-383E-584B-979B-4609E6543015}" type="datetime1">
               <a:rPr lang="en-SG" smtClean="0"/>
-              <a:t>10/10/15</a:t>
+              <a:t>4/11/15</a:t>
             </a:fld>
             <a:endParaRPr lang="en-US"/>
           </a:p>

</xml_diff>

<commit_message>
update dates and slide numbers
</commit_message>
<xml_diff>
--- a/ppt/Specifying-Compatible-Sharing-in-Data-Structures.pptx
+++ b/ppt/Specifying-Compatible-Sharing-in-Data-Structures.pptx
@@ -1193,9 +1193,9 @@
           <a:bodyPr/>
           <a:lstStyle/>
           <a:p>
-            <a:fld id="{F6C06A12-AF4B-0A4B-BCC3-3D437478D93E}" type="datetime1">
+            <a:fld id="{83BBDD5F-12B7-DE49-B9CE-B3781D08CF93}" type="datetime1">
               <a:rPr lang="en-SG" smtClean="0"/>
-              <a:t>4/11/15</a:t>
+              <a:t>5/11/15</a:t>
             </a:fld>
             <a:endParaRPr lang="en-US"/>
           </a:p>
@@ -1367,9 +1367,9 @@
           <a:bodyPr/>
           <a:lstStyle/>
           <a:p>
-            <a:fld id="{1C37227D-13E1-C04E-8B65-4DFAF0556D76}" type="datetime1">
+            <a:fld id="{9FDF43D7-6155-AD4D-88E2-F542E4B4CA84}" type="datetime1">
               <a:rPr lang="en-SG" smtClean="0"/>
-              <a:t>4/11/15</a:t>
+              <a:t>5/11/15</a:t>
             </a:fld>
             <a:endParaRPr lang="en-US"/>
           </a:p>
@@ -1551,9 +1551,9 @@
           <a:bodyPr/>
           <a:lstStyle/>
           <a:p>
-            <a:fld id="{56491E7B-8A37-CC4A-B6B8-36529154873A}" type="datetime1">
+            <a:fld id="{D51DFD4D-7FA0-5247-8799-48EAB28F68EB}" type="datetime1">
               <a:rPr lang="en-SG" smtClean="0"/>
-              <a:t>4/11/15</a:t>
+              <a:t>5/11/15</a:t>
             </a:fld>
             <a:endParaRPr lang="en-US"/>
           </a:p>
@@ -1725,9 +1725,9 @@
           <a:bodyPr/>
           <a:lstStyle/>
           <a:p>
-            <a:fld id="{1469CC5A-7EEF-5C47-A97F-1DBCC349BA49}" type="datetime1">
+            <a:fld id="{6F5B64B6-CB5D-5A4F-B703-E33168CA1E98}" type="datetime1">
               <a:rPr lang="en-SG" smtClean="0"/>
-              <a:t>4/11/15</a:t>
+              <a:t>5/11/15</a:t>
             </a:fld>
             <a:endParaRPr lang="en-US"/>
           </a:p>
@@ -1975,9 +1975,9 @@
           <a:bodyPr/>
           <a:lstStyle/>
           <a:p>
-            <a:fld id="{69EE7C4A-5F23-AA4A-8FC2-9005C956FC8C}" type="datetime1">
+            <a:fld id="{B6B35336-029D-9741-9C8A-1C890F4130CC}" type="datetime1">
               <a:rPr lang="en-SG" smtClean="0"/>
-              <a:t>4/11/15</a:t>
+              <a:t>5/11/15</a:t>
             </a:fld>
             <a:endParaRPr lang="en-US"/>
           </a:p>
@@ -2267,9 +2267,9 @@
           <a:bodyPr/>
           <a:lstStyle/>
           <a:p>
-            <a:fld id="{A59113FF-4167-8147-90FE-E46A8BC17EC7}" type="datetime1">
+            <a:fld id="{21803AA3-3211-F540-A15E-FAFB9BAC6F81}" type="datetime1">
               <a:rPr lang="en-SG" smtClean="0"/>
-              <a:t>4/11/15</a:t>
+              <a:t>5/11/15</a:t>
             </a:fld>
             <a:endParaRPr lang="en-US"/>
           </a:p>
@@ -2693,9 +2693,9 @@
           <a:bodyPr/>
           <a:lstStyle/>
           <a:p>
-            <a:fld id="{C0B7BC73-F81C-C448-AB68-DB74F3CF97F4}" type="datetime1">
+            <a:fld id="{49831BA4-8577-3D47-877E-2FC385C89E94}" type="datetime1">
               <a:rPr lang="en-SG" smtClean="0"/>
-              <a:t>4/11/15</a:t>
+              <a:t>5/11/15</a:t>
             </a:fld>
             <a:endParaRPr lang="en-US"/>
           </a:p>
@@ -2815,9 +2815,9 @@
           <a:bodyPr/>
           <a:lstStyle/>
           <a:p>
-            <a:fld id="{3C449545-CF85-B042-9113-BD2EBFA692F1}" type="datetime1">
+            <a:fld id="{059DA19D-5B09-B24F-AE99-FBB277838047}" type="datetime1">
               <a:rPr lang="en-SG" smtClean="0"/>
-              <a:t>4/11/15</a:t>
+              <a:t>5/11/15</a:t>
             </a:fld>
             <a:endParaRPr lang="en-US"/>
           </a:p>
@@ -2914,9 +2914,9 @@
           <a:bodyPr/>
           <a:lstStyle/>
           <a:p>
-            <a:fld id="{0E676A48-F04A-3B47-9A80-D956DAF55D2F}" type="datetime1">
+            <a:fld id="{9E402BE7-04F9-584D-B9EB-020A5D6A078D}" type="datetime1">
               <a:rPr lang="en-SG" smtClean="0"/>
-              <a:t>4/11/15</a:t>
+              <a:t>5/11/15</a:t>
             </a:fld>
             <a:endParaRPr lang="en-US"/>
           </a:p>
@@ -3195,9 +3195,9 @@
           <a:bodyPr/>
           <a:lstStyle/>
           <a:p>
-            <a:fld id="{90EE89E2-6073-6C44-B738-74E1C8FAD217}" type="datetime1">
+            <a:fld id="{D92D7B34-7FA9-604B-A0B3-C37367179684}" type="datetime1">
               <a:rPr lang="en-SG" smtClean="0"/>
-              <a:t>4/11/15</a:t>
+              <a:t>5/11/15</a:t>
             </a:fld>
             <a:endParaRPr lang="en-US"/>
           </a:p>
@@ -3452,9 +3452,9 @@
           <a:bodyPr/>
           <a:lstStyle/>
           <a:p>
-            <a:fld id="{A75F4F08-03EA-0541-AC5B-472575311224}" type="datetime1">
+            <a:fld id="{4E88CC5A-2111-D349-94AC-11E17BB3B8E2}" type="datetime1">
               <a:rPr lang="en-SG" smtClean="0"/>
-              <a:t>4/11/15</a:t>
+              <a:t>5/11/15</a:t>
             </a:fld>
             <a:endParaRPr lang="en-US"/>
           </a:p>
@@ -3669,9 +3669,9 @@
             </a:lvl1pPr>
           </a:lstStyle>
           <a:p>
-            <a:fld id="{CC7A2F2B-736D-A54C-826A-F22E15BB5F2D}" type="datetime1">
+            <a:fld id="{9777C0AE-08A4-F244-BC00-3FD6879F3A09}" type="datetime1">
               <a:rPr lang="en-SG" smtClean="0"/>
-              <a:t>4/11/15</a:t>
+              <a:t>5/11/15</a:t>
             </a:fld>
             <a:endParaRPr lang="en-US"/>
           </a:p>
@@ -4421,9 +4421,9 @@
           <a:bodyPr/>
           <a:lstStyle/>
           <a:p>
-            <a:fld id="{2B94DB4C-A62D-4644-AA0D-64F079736822}" type="datetime1">
+            <a:fld id="{96D9A59B-0D32-E449-8AB0-A78AF6AABAA5}" type="datetime1">
               <a:rPr lang="en-SG" smtClean="0"/>
-              <a:t>4/11/15</a:t>
+              <a:t>5/11/15</a:t>
             </a:fld>
             <a:endParaRPr lang="en-US"/>
           </a:p>
@@ -5140,9 +5140,9 @@
           <a:bodyPr/>
           <a:lstStyle/>
           <a:p>
-            <a:fld id="{E1EC81D5-2AB1-D847-A86D-86A503A9E9EA}" type="datetime1">
+            <a:fld id="{885A55C3-6470-4C42-9FBF-7571618EB60D}" type="datetime1">
               <a:rPr lang="en-SG" smtClean="0"/>
-              <a:t>4/11/15</a:t>
+              <a:t>5/11/15</a:t>
             </a:fld>
             <a:endParaRPr lang="en-US"/>
           </a:p>
@@ -5358,9 +5358,9 @@
           <a:bodyPr/>
           <a:lstStyle/>
           <a:p>
-            <a:fld id="{088FD039-C2F7-984A-80BC-74324AA67ADB}" type="datetime1">
+            <a:fld id="{C4A742FD-3EE6-8443-A58A-111107C7EE12}" type="datetime1">
               <a:rPr lang="en-SG" smtClean="0"/>
-              <a:t>4/11/15</a:t>
+              <a:t>5/11/15</a:t>
             </a:fld>
             <a:endParaRPr lang="en-US"/>
           </a:p>
@@ -6222,9 +6222,9 @@
           <a:bodyPr/>
           <a:lstStyle/>
           <a:p>
-            <a:fld id="{7D860D0A-92BF-2949-B457-A3379F310A5C}" type="datetime1">
+            <a:fld id="{1517D3C5-0166-E842-852C-EFBF9AF1C33D}" type="datetime1">
               <a:rPr lang="en-SG" smtClean="0"/>
-              <a:t>4/11/15</a:t>
+              <a:t>5/11/15</a:t>
             </a:fld>
             <a:endParaRPr lang="en-US"/>
           </a:p>
@@ -7510,9 +7510,9 @@
           <a:bodyPr/>
           <a:lstStyle/>
           <a:p>
-            <a:fld id="{C369C776-9F4F-F545-B5D4-15371A6096C0}" type="datetime1">
+            <a:fld id="{00685DA3-26DC-E241-B126-7DFC6F1B61FE}" type="datetime1">
               <a:rPr lang="en-SG" smtClean="0"/>
-              <a:t>4/11/15</a:t>
+              <a:t>5/11/15</a:t>
             </a:fld>
             <a:endParaRPr lang="en-US"/>
           </a:p>
@@ -8440,9 +8440,9 @@
           <a:bodyPr/>
           <a:lstStyle/>
           <a:p>
-            <a:fld id="{E690F8F4-367F-924D-9410-DE1B16B44EDC}" type="datetime1">
+            <a:fld id="{AF2CFE55-9D57-904B-B84B-322167999898}" type="datetime1">
               <a:rPr lang="en-SG" smtClean="0"/>
-              <a:t>4/11/15</a:t>
+              <a:t>5/11/15</a:t>
             </a:fld>
             <a:endParaRPr lang="en-US"/>
           </a:p>
@@ -8634,7 +8634,7 @@
           <a:bodyPr/>
           <a:lstStyle/>
           <a:p>
-            <a:fld id="{6369BB91-09DC-7049-B813-D3C0252D4D51}" type="datetime1">
+            <a:fld id="{145266EA-0B09-8B4A-94DB-ABBEC5F941A5}" type="datetime1">
               <a:rPr lang="en-SG" smtClean="0"/>
               <a:t>5/11/15</a:t>
             </a:fld>
@@ -9221,9 +9221,9 @@
           <a:bodyPr/>
           <a:lstStyle/>
           <a:p>
-            <a:fld id="{204DE5AF-4F76-EA4D-8E7E-52F08C16A60B}" type="datetime1">
+            <a:fld id="{133B78C2-2CC9-DB45-91CD-0EB55B25C813}" type="datetime1">
               <a:rPr lang="en-SG" smtClean="0"/>
-              <a:t>4/11/15</a:t>
+              <a:t>5/11/15</a:t>
             </a:fld>
             <a:endParaRPr lang="en-US"/>
           </a:p>
@@ -10141,7 +10141,7 @@
           <a:bodyPr/>
           <a:lstStyle/>
           <a:p>
-            <a:fld id="{9DEA4400-211C-4C45-BCD3-9B4BC5D39E06}" type="datetime1">
+            <a:fld id="{BBCC2ECA-F387-2D49-A043-652665911484}" type="datetime1">
               <a:rPr lang="en-SG" smtClean="0"/>
               <a:t>5/11/15</a:t>
             </a:fld>
@@ -10669,9 +10669,9 @@
           <a:bodyPr/>
           <a:lstStyle/>
           <a:p>
-            <a:fld id="{1AA8C59A-0B9D-714E-9731-F2CA1E88AE2A}" type="datetime1">
+            <a:fld id="{000DB820-2C1E-EB4D-B255-E542C9847CDE}" type="datetime1">
               <a:rPr lang="en-SG" smtClean="0"/>
-              <a:t>4/11/15</a:t>
+              <a:t>5/11/15</a:t>
             </a:fld>
             <a:endParaRPr lang="en-US"/>
           </a:p>
@@ -11270,9 +11270,9 @@
           <a:bodyPr/>
           <a:lstStyle/>
           <a:p>
-            <a:fld id="{667D34EF-ED91-B44E-ADDC-294041380476}" type="datetime1">
+            <a:fld id="{6C31041D-8AF9-FF4C-BCC2-16A9307770F6}" type="datetime1">
               <a:rPr lang="en-SG" smtClean="0"/>
-              <a:t>4/11/15</a:t>
+              <a:t>5/11/15</a:t>
             </a:fld>
             <a:endParaRPr lang="en-US"/>
           </a:p>
@@ -11878,9 +11878,9 @@
           <a:bodyPr/>
           <a:lstStyle/>
           <a:p>
-            <a:fld id="{7F770E69-B63C-E743-9955-FD71BE6C0BC7}" type="datetime1">
+            <a:fld id="{CF1309EE-83C0-D749-9FF1-57AB4597B2FB}" type="datetime1">
               <a:rPr lang="en-SG" smtClean="0"/>
-              <a:t>4/11/15</a:t>
+              <a:t>5/11/15</a:t>
             </a:fld>
             <a:endParaRPr lang="en-US"/>
           </a:p>
@@ -12404,9 +12404,9 @@
           <a:bodyPr/>
           <a:lstStyle/>
           <a:p>
-            <a:fld id="{B0ECE607-8E43-144B-BD66-8A0B9FA5A4E9}" type="datetime1">
+            <a:fld id="{823259DC-7301-0C4A-BEC3-EDFC6EE232B6}" type="datetime1">
               <a:rPr lang="en-SG" smtClean="0"/>
-              <a:t>4/11/15</a:t>
+              <a:t>5/11/15</a:t>
             </a:fld>
             <a:endParaRPr lang="en-US"/>
           </a:p>
@@ -12948,9 +12948,9 @@
           <a:bodyPr/>
           <a:lstStyle/>
           <a:p>
-            <a:fld id="{CD68A4BB-6243-5A4D-B575-BE76C3EEDD60}" type="datetime1">
+            <a:fld id="{F37D9A0A-480D-8742-848F-FB6F621C0C8C}" type="datetime1">
               <a:rPr lang="en-SG" smtClean="0"/>
-              <a:t>4/11/15</a:t>
+              <a:t>5/11/15</a:t>
             </a:fld>
             <a:endParaRPr lang="en-US"/>
           </a:p>
@@ -13180,9 +13180,9 @@
           <a:bodyPr/>
           <a:lstStyle/>
           <a:p>
-            <a:fld id="{1ABA7FF9-3FEC-6740-BCC2-FB5B6EA92391}" type="datetime1">
+            <a:fld id="{4B77A3E4-8999-1047-B17B-709F01E61C92}" type="datetime1">
               <a:rPr lang="en-SG" smtClean="0"/>
-              <a:t>4/11/15</a:t>
+              <a:t>5/11/15</a:t>
             </a:fld>
             <a:endParaRPr lang="en-US"/>
           </a:p>
@@ -13977,9 +13977,9 @@
           <a:bodyPr/>
           <a:lstStyle/>
           <a:p>
-            <a:fld id="{3BEE7D4A-C63E-A44F-964C-C6FFED44BA2E}" type="datetime1">
+            <a:fld id="{3EF74D88-33B3-8845-9906-BCFED4BD73FF}" type="datetime1">
               <a:rPr lang="en-SG" smtClean="0"/>
-              <a:t>4/11/15</a:t>
+              <a:t>5/11/15</a:t>
             </a:fld>
             <a:endParaRPr lang="en-US"/>
           </a:p>
@@ -14159,9 +14159,9 @@
           <a:bodyPr/>
           <a:lstStyle/>
           <a:p>
-            <a:fld id="{C3F0980A-268F-F14D-A251-4409AF1E58A0}" type="datetime1">
+            <a:fld id="{209E7B74-1014-6445-8FB5-A139B7BD1583}" type="datetime1">
               <a:rPr lang="en-SG" smtClean="0"/>
-              <a:t>4/11/15</a:t>
+              <a:t>5/11/15</a:t>
             </a:fld>
             <a:endParaRPr lang="en-US"/>
           </a:p>
@@ -14356,7 +14356,7 @@
           <a:bodyPr/>
           <a:lstStyle/>
           <a:p>
-            <a:fld id="{A2FEE624-2C80-1A47-8DD3-BA8C23A019B5}" type="datetime1">
+            <a:fld id="{84BAF84F-B4E1-204C-9A75-8AB27CA49273}" type="datetime1">
               <a:rPr lang="en-SG" smtClean="0"/>
               <a:t>5/11/15</a:t>
             </a:fld>
@@ -14545,9 +14545,9 @@
           <a:bodyPr/>
           <a:lstStyle/>
           <a:p>
-            <a:fld id="{502A57F2-8AAA-4646-A372-732CF6177523}" type="datetime1">
+            <a:fld id="{FFD9117D-3849-0641-9EB4-90C6DBCF5B14}" type="datetime1">
               <a:rPr lang="en-SG" smtClean="0"/>
-              <a:t>4/11/15</a:t>
+              <a:t>5/11/15</a:t>
             </a:fld>
             <a:endParaRPr lang="en-US"/>
           </a:p>
@@ -17020,9 +17020,9 @@
           <a:bodyPr/>
           <a:lstStyle/>
           <a:p>
-            <a:fld id="{6918E020-D9E5-6246-A073-733864963C8D}" type="datetime1">
+            <a:fld id="{608AE17A-39C0-2144-AB89-1498F3B63171}" type="datetime1">
               <a:rPr lang="en-SG" smtClean="0"/>
-              <a:t>4/11/15</a:t>
+              <a:t>5/11/15</a:t>
             </a:fld>
             <a:endParaRPr lang="en-US"/>
           </a:p>
@@ -17283,9 +17283,9 @@
           <a:bodyPr/>
           <a:lstStyle/>
           <a:p>
-            <a:fld id="{8842D9B0-6DEC-BC4C-82D7-3C8F8C7C66DB}" type="datetime1">
+            <a:fld id="{5947CA30-AD48-5A4C-B359-E4D1715C6BB6}" type="datetime1">
               <a:rPr lang="en-SG" smtClean="0"/>
-              <a:t>4/11/15</a:t>
+              <a:t>5/11/15</a:t>
             </a:fld>
             <a:endParaRPr lang="en-US"/>
           </a:p>
@@ -20404,9 +20404,9 @@
           <a:bodyPr/>
           <a:lstStyle/>
           <a:p>
-            <a:fld id="{86D63118-CD2A-9649-B5EC-6AAA7E4EE4D4}" type="datetime1">
+            <a:fld id="{7CBF1FF7-914E-FB43-A30A-4D0EF2EFA516}" type="datetime1">
               <a:rPr lang="en-SG" smtClean="0"/>
-              <a:t>4/11/15</a:t>
+              <a:t>5/11/15</a:t>
             </a:fld>
             <a:endParaRPr lang="en-US"/>
           </a:p>
@@ -21787,9 +21787,9 @@
           <a:bodyPr/>
           <a:lstStyle/>
           <a:p>
-            <a:fld id="{73E074C7-DBE0-0F41-BADE-A07B965CE4C7}" type="datetime1">
+            <a:fld id="{612BB554-F949-C748-AC1B-1783F7342D94}" type="datetime1">
               <a:rPr lang="en-SG" smtClean="0"/>
-              <a:t>4/11/15</a:t>
+              <a:t>5/11/15</a:t>
             </a:fld>
             <a:endParaRPr lang="en-US"/>
           </a:p>
@@ -22335,9 +22335,9 @@
           <a:bodyPr/>
           <a:lstStyle/>
           <a:p>
-            <a:fld id="{23F6C8B2-7CC1-BC47-9500-5126A822121C}" type="datetime1">
+            <a:fld id="{CF219E03-B6DD-4D4A-9FA7-039AD2407B2D}" type="datetime1">
               <a:rPr lang="en-SG" smtClean="0"/>
-              <a:t>4/11/15</a:t>
+              <a:t>5/11/15</a:t>
             </a:fld>
             <a:endParaRPr lang="en-US"/>
           </a:p>
@@ -25924,9 +25924,9 @@
           <a:bodyPr/>
           <a:lstStyle/>
           <a:p>
-            <a:fld id="{5F2EA5F6-383E-584B-979B-4609E6543015}" type="datetime1">
+            <a:fld id="{B3BEB807-812E-B24C-A7F2-AF4E4446B1C3}" type="datetime1">
               <a:rPr lang="en-SG" smtClean="0"/>
-              <a:t>4/11/15</a:t>
+              <a:t>5/11/15</a:t>
             </a:fld>
             <a:endParaRPr lang="en-US"/>
           </a:p>

</xml_diff>